<commit_message>
Adding Unit 9 Assignment
</commit_message>
<xml_diff>
--- a/Unit 9/LiveClassWork.pptx
+++ b/Unit 9/LiveClassWork.pptx
@@ -327,7 +327,7 @@
             <a:fld id="{B61BEF0D-F0BB-DE4B-95CE-6DB70DBA9567}" type="datetimeFigureOut">
               <a:rPr lang="en-US" dirty="0"/>
               <a:pPr/>
-              <a:t>10/24/2018</a:t>
+              <a:t>10/25/2018</a:t>
             </a:fld>
             <a:endParaRPr lang="en-US" dirty="0"/>
           </a:p>
@@ -615,7 +615,7 @@
             <a:fld id="{B61BEF0D-F0BB-DE4B-95CE-6DB70DBA9567}" type="datetimeFigureOut">
               <a:rPr lang="en-US" dirty="0"/>
               <a:pPr/>
-              <a:t>10/24/2018</a:t>
+              <a:t>10/25/2018</a:t>
             </a:fld>
             <a:endParaRPr lang="en-US" dirty="0"/>
           </a:p>
@@ -871,7 +871,7 @@
             <a:fld id="{B61BEF0D-F0BB-DE4B-95CE-6DB70DBA9567}" type="datetimeFigureOut">
               <a:rPr lang="en-US" dirty="0"/>
               <a:pPr/>
-              <a:t>10/24/2018</a:t>
+              <a:t>10/25/2018</a:t>
             </a:fld>
             <a:endParaRPr lang="en-US" dirty="0"/>
           </a:p>
@@ -1337,7 +1337,7 @@
             <a:fld id="{B61BEF0D-F0BB-DE4B-95CE-6DB70DBA9567}" type="datetimeFigureOut">
               <a:rPr lang="en-US" dirty="0"/>
               <a:pPr/>
-              <a:t>10/24/2018</a:t>
+              <a:t>10/25/2018</a:t>
             </a:fld>
             <a:endParaRPr lang="en-US" dirty="0"/>
           </a:p>
@@ -1514,7 +1514,7 @@
             <a:fld id="{B61BEF0D-F0BB-DE4B-95CE-6DB70DBA9567}" type="datetimeFigureOut">
               <a:rPr lang="en-US" dirty="0"/>
               <a:pPr/>
-              <a:t>10/24/2018</a:t>
+              <a:t>10/25/2018</a:t>
             </a:fld>
             <a:endParaRPr lang="en-US" dirty="0"/>
           </a:p>
@@ -2087,7 +2087,7 @@
             <a:fld id="{B61BEF0D-F0BB-DE4B-95CE-6DB70DBA9567}" type="datetimeFigureOut">
               <a:rPr lang="en-US" dirty="0"/>
               <a:pPr/>
-              <a:t>10/24/2018</a:t>
+              <a:t>10/25/2018</a:t>
             </a:fld>
             <a:endParaRPr lang="en-US" dirty="0"/>
           </a:p>
@@ -2416,7 +2416,7 @@
             <a:fld id="{B61BEF0D-F0BB-DE4B-95CE-6DB70DBA9567}" type="datetimeFigureOut">
               <a:rPr lang="en-US" dirty="0"/>
               <a:pPr/>
-              <a:t>10/24/2018</a:t>
+              <a:t>10/25/2018</a:t>
             </a:fld>
             <a:endParaRPr lang="en-US" dirty="0"/>
           </a:p>
@@ -2588,7 +2588,7 @@
             <a:fld id="{B61BEF0D-F0BB-DE4B-95CE-6DB70DBA9567}" type="datetimeFigureOut">
               <a:rPr lang="en-US" dirty="0"/>
               <a:pPr/>
-              <a:t>10/24/2018</a:t>
+              <a:t>10/25/2018</a:t>
             </a:fld>
             <a:endParaRPr lang="en-US" dirty="0"/>
           </a:p>
@@ -2765,7 +2765,7 @@
             <a:fld id="{B61BEF0D-F0BB-DE4B-95CE-6DB70DBA9567}" type="datetimeFigureOut">
               <a:rPr lang="en-US" dirty="0"/>
               <a:pPr/>
-              <a:t>10/24/2018</a:t>
+              <a:t>10/25/2018</a:t>
             </a:fld>
             <a:endParaRPr lang="en-US" dirty="0"/>
           </a:p>
@@ -2932,7 +2932,7 @@
             <a:fld id="{B61BEF0D-F0BB-DE4B-95CE-6DB70DBA9567}" type="datetimeFigureOut">
               <a:rPr lang="en-US" dirty="0"/>
               <a:pPr/>
-              <a:t>10/24/2018</a:t>
+              <a:t>10/25/2018</a:t>
             </a:fld>
             <a:endParaRPr lang="en-US" dirty="0"/>
           </a:p>
@@ -3186,7 +3186,7 @@
             <a:fld id="{B61BEF0D-F0BB-DE4B-95CE-6DB70DBA9567}" type="datetimeFigureOut">
               <a:rPr lang="en-US" dirty="0"/>
               <a:pPr/>
-              <a:t>10/24/2018</a:t>
+              <a:t>10/25/2018</a:t>
             </a:fld>
             <a:endParaRPr lang="en-US" dirty="0"/>
           </a:p>
@@ -3475,7 +3475,7 @@
             <a:fld id="{B61BEF0D-F0BB-DE4B-95CE-6DB70DBA9567}" type="datetimeFigureOut">
               <a:rPr lang="en-US" dirty="0"/>
               <a:pPr/>
-              <a:t>10/24/2018</a:t>
+              <a:t>10/25/2018</a:t>
             </a:fld>
             <a:endParaRPr lang="en-US" dirty="0"/>
           </a:p>
@@ -3902,7 +3902,7 @@
             <a:fld id="{B61BEF0D-F0BB-DE4B-95CE-6DB70DBA9567}" type="datetimeFigureOut">
               <a:rPr lang="en-US" dirty="0"/>
               <a:pPr/>
-              <a:t>10/24/2018</a:t>
+              <a:t>10/25/2018</a:t>
             </a:fld>
             <a:endParaRPr lang="en-US" dirty="0"/>
           </a:p>
@@ -4017,7 +4017,7 @@
             <a:fld id="{B61BEF0D-F0BB-DE4B-95CE-6DB70DBA9567}" type="datetimeFigureOut">
               <a:rPr lang="en-US" dirty="0"/>
               <a:pPr/>
-              <a:t>10/24/2018</a:t>
+              <a:t>10/25/2018</a:t>
             </a:fld>
             <a:endParaRPr lang="en-US" dirty="0"/>
           </a:p>
@@ -4109,7 +4109,7 @@
             <a:fld id="{B61BEF0D-F0BB-DE4B-95CE-6DB70DBA9567}" type="datetimeFigureOut">
               <a:rPr lang="en-US" dirty="0"/>
               <a:pPr/>
-              <a:t>10/24/2018</a:t>
+              <a:t>10/25/2018</a:t>
             </a:fld>
             <a:endParaRPr lang="en-US" dirty="0"/>
           </a:p>
@@ -4389,7 +4389,7 @@
             <a:fld id="{B61BEF0D-F0BB-DE4B-95CE-6DB70DBA9567}" type="datetimeFigureOut">
               <a:rPr lang="en-US" dirty="0"/>
               <a:pPr/>
-              <a:t>10/24/2018</a:t>
+              <a:t>10/25/2018</a:t>
             </a:fld>
             <a:endParaRPr lang="en-US" dirty="0"/>
           </a:p>
@@ -4677,7 +4677,7 @@
             <a:fld id="{B61BEF0D-F0BB-DE4B-95CE-6DB70DBA9567}" type="datetimeFigureOut">
               <a:rPr lang="en-US" dirty="0"/>
               <a:pPr/>
-              <a:t>10/24/2018</a:t>
+              <a:t>10/25/2018</a:t>
             </a:fld>
             <a:endParaRPr lang="en-US" dirty="0"/>
           </a:p>
@@ -4905,7 +4905,7 @@
             <a:fld id="{B61BEF0D-F0BB-DE4B-95CE-6DB70DBA9567}" type="datetimeFigureOut">
               <a:rPr lang="en-US" dirty="0"/>
               <a:pPr/>
-              <a:t>10/24/2018</a:t>
+              <a:t>10/25/2018</a:t>
             </a:fld>
             <a:endParaRPr lang="en-US" dirty="0"/>
           </a:p>
@@ -5789,7 +5789,7 @@
         <p:spPr>
           <a:xfrm>
             <a:off x="7907270" y="98265"/>
-            <a:ext cx="4228924" cy="5632311"/>
+            <a:ext cx="4228924" cy="5262979"/>
           </a:xfrm>
           <a:prstGeom prst="rect">
             <a:avLst/>
@@ -5812,15 +5812,7 @@
           <a:p>
             <a:r>
               <a:rPr lang="en-US" sz="1200" dirty="0"/>
-              <a:t>x_1 &lt;- </a:t>
-            </a:r>
-            <a:r>
-              <a:rPr lang="en-US" sz="1200" dirty="0" err="1"/>
-              <a:t>rnorm</a:t>
-            </a:r>
-            <a:r>
-              <a:rPr lang="en-US" sz="1200" dirty="0"/>
-              <a:t>(1000,5,7) #1000 Random numbers mean 5 and standard deviation of 7</a:t>
+              <a:t>x_1 &lt;- rnorm(1000,5,7) #1000 Random numbers mean 5 and standard deviation of 7</a:t>
             </a:r>
           </a:p>
           <a:p>
@@ -5832,23 +5824,15 @@
               <a:t>#Simulate gamma </a:t>
             </a:r>
             <a:r>
-              <a:rPr lang="en-US" sz="1200" dirty="0" err="1"/>
-              <a:t>distrubation</a:t>
+              <a:rPr lang="en-US" sz="1200" dirty="0" smtClean="0"/>
+              <a:t>distribution</a:t>
             </a:r>
             <a:endParaRPr lang="en-US" sz="1200" dirty="0"/>
           </a:p>
           <a:p>
             <a:r>
               <a:rPr lang="en-US" sz="1200" dirty="0"/>
-              <a:t>x_2 &lt;- </a:t>
-            </a:r>
-            <a:r>
-              <a:rPr lang="en-US" sz="1200" dirty="0" err="1"/>
-              <a:t>rgamma</a:t>
-            </a:r>
-            <a:r>
-              <a:rPr lang="en-US" sz="1200" dirty="0"/>
-              <a:t> (n = 1000, shape = 1, scale = 1)</a:t>
+              <a:t>x_2 &lt;- rgamma (n = 1000, shape = 1, scale = 1)</a:t>
             </a:r>
           </a:p>
           <a:p>
@@ -5885,33 +5869,20 @@
           </a:p>
           <a:p>
             <a:r>
-              <a:rPr lang="en-US" sz="1200" dirty="0" err="1"/>
-              <a:t>true_error</a:t>
-            </a:r>
-            <a:r>
               <a:rPr lang="en-US" sz="1200" dirty="0"/>
-              <a:t> &lt;- </a:t>
-            </a:r>
-            <a:r>
-              <a:rPr lang="en-US" sz="1200" dirty="0" err="1"/>
-              <a:t>rnorm</a:t>
-            </a:r>
+              <a:t>true_error &lt;- rnorm(1000,0,2)</a:t>
+            </a:r>
+          </a:p>
+          <a:p>
             <a:r>
               <a:rPr lang="en-US" sz="1200" dirty="0"/>
-              <a:t>(1000,0,2)</a:t>
-            </a:r>
-          </a:p>
-          <a:p>
-            <a:r>
-              <a:rPr lang="en-US" sz="1200" dirty="0"/>
-              <a:t>true_beta_0 &lt;- 1.1</a:t>
-            </a:r>
-          </a:p>
-          <a:p>
-            <a:r>
-              <a:rPr lang="en-US" sz="1200" dirty="0"/>
-              <a:t>#true_beta_0 &lt;- 3.1</a:t>
-            </a:r>
+              <a:t>true_beta_0 &lt;- </a:t>
+            </a:r>
+            <a:r>
+              <a:rPr lang="en-US" sz="1200" dirty="0" smtClean="0"/>
+              <a:t>1.1</a:t>
+            </a:r>
+            <a:endParaRPr lang="en-US" sz="1200" dirty="0"/>
           </a:p>
           <a:p>
             <a:r>
@@ -5921,29 +5892,22 @@
           </a:p>
           <a:p>
             <a:r>
+              <a:rPr lang="en-US" sz="1200" dirty="0" smtClean="0"/>
+              <a:t>true_beta_2 </a:t>
+            </a:r>
+            <a:r>
               <a:rPr lang="en-US" sz="1200" dirty="0"/>
-              <a:t>#true_beta_1 &lt;- 7.3</a:t>
-            </a:r>
+              <a:t>&lt;- 6.5</a:t>
+            </a:r>
+          </a:p>
+          <a:p>
+            <a:endParaRPr lang="en-US" sz="1200" dirty="0"/>
           </a:p>
           <a:p>
             <a:r>
               <a:rPr lang="en-US" sz="1200" dirty="0"/>
-              <a:t>true_beta_2 &lt;- 6.5</a:t>
-            </a:r>
-          </a:p>
-          <a:p>
-            <a:endParaRPr lang="en-US" sz="1200" dirty="0"/>
-          </a:p>
-          <a:p>
-            <a:r>
-              <a:rPr lang="en-US" sz="1200" dirty="0"/>
-              <a:t>y_1 &lt;- true_beta_0 + true_beta_1*x_1 + </a:t>
-            </a:r>
-            <a:r>
-              <a:rPr lang="en-US" sz="1200" dirty="0" err="1"/>
-              <a:t>true_error</a:t>
-            </a:r>
-            <a:endParaRPr lang="en-US" sz="1200" dirty="0"/>
+              <a:t>y_1 &lt;- true_beta_0 + true_beta_1*x_1 + true_error</a:t>
+            </a:r>
           </a:p>
           <a:p>
             <a:r>
@@ -5974,15 +5938,7 @@
             </a:r>
             <a:r>
               <a:rPr lang="en-US" sz="1200" dirty="0"/>
-              <a:t> = "1000 Random Numbers with </a:t>
-            </a:r>
-            <a:r>
-              <a:rPr lang="en-US" sz="1200" dirty="0" err="1"/>
-              <a:t>rnorm</a:t>
-            </a:r>
-            <a:r>
-              <a:rPr lang="en-US" sz="1200" dirty="0"/>
-              <a:t>",</a:t>
+              <a:t> = "1000 Random Numbers with rnorm",</a:t>
             </a:r>
           </a:p>
           <a:p>
@@ -6024,21 +5980,16 @@
               <a:t>#using gamma </a:t>
             </a:r>
             <a:r>
-              <a:rPr lang="en-US" sz="1200" dirty="0" err="1"/>
-              <a:t>distrubation</a:t>
+              <a:rPr lang="en-US" sz="1200" dirty="0" smtClean="0"/>
+              <a:t>distribution</a:t>
             </a:r>
             <a:endParaRPr lang="en-US" sz="1200" dirty="0"/>
           </a:p>
           <a:p>
             <a:r>
               <a:rPr lang="en-US" sz="1200" dirty="0"/>
-              <a:t>y_2 &lt;- true_beta_0 + true_beta_1*x_2 + </a:t>
-            </a:r>
-            <a:r>
-              <a:rPr lang="en-US" sz="1200" dirty="0" err="1"/>
-              <a:t>true_error</a:t>
-            </a:r>
-            <a:endParaRPr lang="en-US" sz="1200" dirty="0"/>
+              <a:t>y_2 &lt;- true_beta_0 + true_beta_1*x_2 + true_error</a:t>
+            </a:r>
           </a:p>
           <a:p>
             <a:r>
@@ -6069,15 +6020,7 @@
             </a:r>
             <a:r>
               <a:rPr lang="en-US" sz="1200" dirty="0"/>
-              <a:t> = "1000 Random Numbers with </a:t>
-            </a:r>
-            <a:r>
-              <a:rPr lang="en-US" sz="1200" dirty="0" err="1"/>
-              <a:t>rgamma</a:t>
-            </a:r>
-            <a:r>
-              <a:rPr lang="en-US" sz="1200" dirty="0"/>
-              <a:t>",</a:t>
+              <a:t> = "1000 Random Numbers with rgamma",</a:t>
             </a:r>
           </a:p>
           <a:p>
@@ -6377,7 +6320,7 @@
         <p:spPr>
           <a:xfrm>
             <a:off x="7934325" y="256856"/>
-            <a:ext cx="4186488" cy="5632311"/>
+            <a:ext cx="4186488" cy="5262979"/>
           </a:xfrm>
           <a:prstGeom prst="rect">
             <a:avLst/>
@@ -6428,15 +6371,7 @@
           <a:p>
             <a:r>
               <a:rPr lang="en-US" sz="1200" dirty="0"/>
-              <a:t>x_2 &lt;- </a:t>
-            </a:r>
-            <a:r>
-              <a:rPr lang="en-US" sz="1200" dirty="0" err="1"/>
-              <a:t>rgamma</a:t>
-            </a:r>
-            <a:r>
-              <a:rPr lang="en-US" sz="1200" dirty="0"/>
-              <a:t> (n = 1000, shape = 1, scale = 1)</a:t>
+              <a:t>x_2 &lt;- rgamma (n = 1000, shape = 1, scale = 1)</a:t>
             </a:r>
           </a:p>
           <a:p>
@@ -6473,30 +6408,8 @@
           </a:p>
           <a:p>
             <a:r>
-              <a:rPr lang="en-US" sz="1200" dirty="0" err="1"/>
-              <a:t>true_error</a:t>
-            </a:r>
-            <a:r>
               <a:rPr lang="en-US" sz="1200" dirty="0"/>
-              <a:t> &lt;- </a:t>
-            </a:r>
-            <a:r>
-              <a:rPr lang="en-US" sz="1200" dirty="0" err="1"/>
-              <a:t>rnorm</a:t>
-            </a:r>
-            <a:r>
-              <a:rPr lang="en-US" sz="1200" dirty="0"/>
-              <a:t>(1000,0,2)</a:t>
-            </a:r>
-          </a:p>
-          <a:p>
-            <a:r>
-              <a:rPr lang="en-US" sz="1200" dirty="0" smtClean="0"/>
-              <a:t>#true_beta_0 </a:t>
-            </a:r>
-            <a:r>
-              <a:rPr lang="en-US" sz="1200" dirty="0"/>
-              <a:t>&lt;- 1.1</a:t>
+              <a:t>true_error &lt;- rnorm(1000,0,2)</a:t>
             </a:r>
           </a:p>
           <a:p>
@@ -6511,16 +6424,6 @@
           </a:p>
           <a:p>
             <a:r>
-              <a:rPr lang="en-US" sz="1200" smtClean="0"/>
-              <a:t>#true_beta_1 </a:t>
-            </a:r>
-            <a:r>
-              <a:rPr lang="en-US" sz="1200" dirty="0"/>
-              <a:t>&lt;- -8.2</a:t>
-            </a:r>
-          </a:p>
-          <a:p>
-            <a:r>
               <a:rPr lang="en-US" sz="1200" dirty="0" smtClean="0"/>
               <a:t>true_beta_1 </a:t>
             </a:r>
@@ -6541,13 +6444,8 @@
           <a:p>
             <a:r>
               <a:rPr lang="en-US" sz="1200" dirty="0"/>
-              <a:t>y_1 &lt;- true_beta_0 + true_beta_1*x_1 + </a:t>
-            </a:r>
-            <a:r>
-              <a:rPr lang="en-US" sz="1200" dirty="0" err="1"/>
-              <a:t>true_error</a:t>
-            </a:r>
-            <a:endParaRPr lang="en-US" sz="1200" dirty="0"/>
+              <a:t>y_1 &lt;- true_beta_0 + true_beta_1*x_1 + true_error</a:t>
+            </a:r>
           </a:p>
           <a:p>
             <a:r>
@@ -6578,15 +6476,7 @@
             </a:r>
             <a:r>
               <a:rPr lang="en-US" sz="1200" dirty="0"/>
-              <a:t> = "1000 Random Numbers with </a:t>
-            </a:r>
-            <a:r>
-              <a:rPr lang="en-US" sz="1200" dirty="0" err="1"/>
-              <a:t>rnorm</a:t>
-            </a:r>
-            <a:r>
-              <a:rPr lang="en-US" sz="1200" dirty="0"/>
-              <a:t>",</a:t>
+              <a:t> = "1000 Random Numbers with rnorm",</a:t>
             </a:r>
           </a:p>
           <a:p>
@@ -6636,13 +6526,8 @@
           <a:p>
             <a:r>
               <a:rPr lang="en-US" sz="1200" dirty="0"/>
-              <a:t>y_2 &lt;- true_beta_0 + true_beta_1*x_2 + </a:t>
-            </a:r>
-            <a:r>
-              <a:rPr lang="en-US" sz="1200" dirty="0" err="1"/>
-              <a:t>true_error</a:t>
-            </a:r>
-            <a:endParaRPr lang="en-US" sz="1200" dirty="0"/>
+              <a:t>y_2 &lt;- true_beta_0 + true_beta_1*x_2 + true_error</a:t>
+            </a:r>
           </a:p>
           <a:p>
             <a:r>
@@ -6673,15 +6558,7 @@
             </a:r>
             <a:r>
               <a:rPr lang="en-US" sz="1200" dirty="0"/>
-              <a:t> = "1000 Random Numbers with </a:t>
-            </a:r>
-            <a:r>
-              <a:rPr lang="en-US" sz="1200" dirty="0" err="1"/>
-              <a:t>rgamma</a:t>
-            </a:r>
-            <a:r>
-              <a:rPr lang="en-US" sz="1200" dirty="0"/>
-              <a:t>",</a:t>
+              <a:t> = "1000 Random Numbers with rgamma",</a:t>
             </a:r>
           </a:p>
           <a:p>

</xml_diff>